<commit_message>
added link to interactive plots
</commit_message>
<xml_diff>
--- a/Presentation/NLP_pres_OY.pptx
+++ b/Presentation/NLP_pres_OY.pptx
@@ -3633,6 +3633,13 @@
   <p:clrMapOvr>
     <a:masterClrMapping/>
   </p:clrMapOvr>
+  <p:timing>
+    <p:tnLst>
+      <p:par>
+        <p:cTn xmlns:p14="http://schemas.microsoft.com/office/powerpoint/2010/main" id="1" dur="indefinite" restart="never" nodeType="tmRoot"/>
+      </p:par>
+    </p:tnLst>
+  </p:timing>
 </p:sld>
 </file>
 
@@ -4493,6 +4500,13 @@
   <p:clrMapOvr>
     <a:masterClrMapping/>
   </p:clrMapOvr>
+  <p:timing>
+    <p:tnLst>
+      <p:par>
+        <p:cTn xmlns:p14="http://schemas.microsoft.com/office/powerpoint/2010/main" id="1" dur="indefinite" restart="never" nodeType="tmRoot"/>
+      </p:par>
+    </p:tnLst>
+  </p:timing>
 </p:sld>
 </file>
 
@@ -4623,6 +4637,13 @@
   <p:clrMapOvr>
     <a:masterClrMapping/>
   </p:clrMapOvr>
+  <p:timing>
+    <p:tnLst>
+      <p:par>
+        <p:cTn xmlns:p14="http://schemas.microsoft.com/office/powerpoint/2010/main" id="1" dur="indefinite" restart="never" nodeType="tmRoot"/>
+      </p:par>
+    </p:tnLst>
+  </p:timing>
 </p:sld>
 </file>
 
@@ -4712,6 +4733,46 @@
           </a:xfrm>
         </p:spPr>
       </p:pic>
+      <p:sp>
+        <p:nvSpPr>
+          <p:cNvPr id="5" name="TextBox 4"/>
+          <p:cNvSpPr txBox="1"/>
+          <p:nvPr/>
+        </p:nvSpPr>
+        <p:spPr>
+          <a:xfrm>
+            <a:off x="5086155" y="6429170"/>
+            <a:ext cx="3600645" cy="369332"/>
+          </a:xfrm>
+          <a:prstGeom prst="rect">
+            <a:avLst/>
+          </a:prstGeom>
+          <a:noFill/>
+        </p:spPr>
+        <p:txBody>
+          <a:bodyPr wrap="square" rtlCol="0">
+            <a:spAutoFit/>
+          </a:bodyPr>
+          <a:lstStyle/>
+          <a:p>
+            <a:r>
+              <a:rPr lang="en-US" dirty="0" err="1" smtClean="0"/>
+              <a:t>Plotly</a:t>
+            </a:r>
+            <a:r>
+              <a:rPr lang="en-US" dirty="0"/>
+              <a:t> dashboard: </a:t>
+            </a:r>
+            <a:r>
+              <a:rPr lang="en-US" dirty="0" smtClean="0">
+                <a:hlinkClick r:id="rId3"/>
+              </a:rPr>
+              <a:t>Interactive plot</a:t>
+            </a:r>
+            <a:endParaRPr lang="en-US" dirty="0"/>
+          </a:p>
+        </p:txBody>
+      </p:sp>
     </p:spTree>
     <p:extLst>
       <p:ext uri="{BB962C8B-B14F-4D97-AF65-F5344CB8AC3E}">
@@ -4722,6 +4783,13 @@
   <p:clrMapOvr>
     <a:masterClrMapping/>
   </p:clrMapOvr>
+  <p:timing>
+    <p:tnLst>
+      <p:par>
+        <p:cTn xmlns:p14="http://schemas.microsoft.com/office/powerpoint/2010/main" id="1" dur="indefinite" restart="never" nodeType="tmRoot"/>
+      </p:par>
+    </p:tnLst>
+  </p:timing>
 </p:sld>
 </file>
 
@@ -4940,6 +5008,13 @@
   <p:clrMapOvr>
     <a:masterClrMapping/>
   </p:clrMapOvr>
+  <p:timing>
+    <p:tnLst>
+      <p:par>
+        <p:cTn xmlns:p14="http://schemas.microsoft.com/office/powerpoint/2010/main" id="1" dur="indefinite" restart="never" nodeType="tmRoot"/>
+      </p:par>
+    </p:tnLst>
+  </p:timing>
 </p:sld>
 </file>
 
@@ -5034,6 +5109,46 @@
           </a:xfrm>
         </p:spPr>
       </p:pic>
+      <p:sp>
+        <p:nvSpPr>
+          <p:cNvPr id="8" name="TextBox 7"/>
+          <p:cNvSpPr txBox="1"/>
+          <p:nvPr/>
+        </p:nvSpPr>
+        <p:spPr>
+          <a:xfrm>
+            <a:off x="5086155" y="6429170"/>
+            <a:ext cx="3600645" cy="369332"/>
+          </a:xfrm>
+          <a:prstGeom prst="rect">
+            <a:avLst/>
+          </a:prstGeom>
+          <a:noFill/>
+        </p:spPr>
+        <p:txBody>
+          <a:bodyPr wrap="square" rtlCol="0">
+            <a:spAutoFit/>
+          </a:bodyPr>
+          <a:lstStyle/>
+          <a:p>
+            <a:r>
+              <a:rPr lang="en-US" dirty="0" err="1" smtClean="0"/>
+              <a:t>Plotly</a:t>
+            </a:r>
+            <a:r>
+              <a:rPr lang="en-US" dirty="0"/>
+              <a:t> dashboard: </a:t>
+            </a:r>
+            <a:r>
+              <a:rPr lang="en-US" dirty="0" smtClean="0">
+                <a:hlinkClick r:id="rId3"/>
+              </a:rPr>
+              <a:t>Interactive plot</a:t>
+            </a:r>
+            <a:endParaRPr lang="en-US" dirty="0"/>
+          </a:p>
+        </p:txBody>
+      </p:sp>
     </p:spTree>
     <p:extLst>
       <p:ext uri="{BB962C8B-B14F-4D97-AF65-F5344CB8AC3E}">
@@ -5044,6 +5159,13 @@
   <p:clrMapOvr>
     <a:masterClrMapping/>
   </p:clrMapOvr>
+  <p:timing>
+    <p:tnLst>
+      <p:par>
+        <p:cTn xmlns:p14="http://schemas.microsoft.com/office/powerpoint/2010/main" id="1" dur="indefinite" restart="never" nodeType="tmRoot"/>
+      </p:par>
+    </p:tnLst>
+  </p:timing>
 </p:sld>
 </file>
 

</xml_diff>